<commit_message>
Update color scheme and add new images
</commit_message>
<xml_diff>
--- a/materials/ppt_template.pptx
+++ b/materials/ppt_template.pptx
@@ -9,9 +9,13 @@
     <p:sldId id="257" r:id="rId3"/>
     <p:sldId id="258" r:id="rId4"/>
     <p:sldId id="260" r:id="rId5"/>
-    <p:sldId id="261" r:id="rId6"/>
-    <p:sldId id="262" r:id="rId7"/>
-    <p:sldId id="259" r:id="rId8"/>
+    <p:sldId id="263" r:id="rId6"/>
+    <p:sldId id="264" r:id="rId7"/>
+    <p:sldId id="266" r:id="rId8"/>
+    <p:sldId id="265" r:id="rId9"/>
+    <p:sldId id="261" r:id="rId10"/>
+    <p:sldId id="262" r:id="rId11"/>
+    <p:sldId id="259" r:id="rId12"/>
   </p:sldIdLst>
   <p:sldSz cx="12192000" cy="6858000"/>
   <p:notesSz cx="6858000" cy="9144000"/>
@@ -265,7 +269,7 @@
           <a:p>
             <a:fld id="{3B8E4CC4-C9D5-4422-B2EF-7898FE601EFC}" type="datetimeFigureOut">
               <a:rPr lang="zh-CN" altLang="en-US" smtClean="0"/>
-              <a:t>2025/2/24</a:t>
+              <a:t>2025/2/26</a:t>
             </a:fld>
             <a:endParaRPr lang="zh-CN" altLang="en-US"/>
           </a:p>
@@ -463,7 +467,7 @@
           <a:p>
             <a:fld id="{3B8E4CC4-C9D5-4422-B2EF-7898FE601EFC}" type="datetimeFigureOut">
               <a:rPr lang="zh-CN" altLang="en-US" smtClean="0"/>
-              <a:t>2025/2/24</a:t>
+              <a:t>2025/2/26</a:t>
             </a:fld>
             <a:endParaRPr lang="zh-CN" altLang="en-US"/>
           </a:p>
@@ -671,7 +675,7 @@
           <a:p>
             <a:fld id="{3B8E4CC4-C9D5-4422-B2EF-7898FE601EFC}" type="datetimeFigureOut">
               <a:rPr lang="zh-CN" altLang="en-US" smtClean="0"/>
-              <a:t>2025/2/24</a:t>
+              <a:t>2025/2/26</a:t>
             </a:fld>
             <a:endParaRPr lang="zh-CN" altLang="en-US"/>
           </a:p>
@@ -869,7 +873,7 @@
           <a:p>
             <a:fld id="{3B8E4CC4-C9D5-4422-B2EF-7898FE601EFC}" type="datetimeFigureOut">
               <a:rPr lang="zh-CN" altLang="en-US" smtClean="0"/>
-              <a:t>2025/2/24</a:t>
+              <a:t>2025/2/26</a:t>
             </a:fld>
             <a:endParaRPr lang="zh-CN" altLang="en-US"/>
           </a:p>
@@ -1144,7 +1148,7 @@
           <a:p>
             <a:fld id="{3B8E4CC4-C9D5-4422-B2EF-7898FE601EFC}" type="datetimeFigureOut">
               <a:rPr lang="zh-CN" altLang="en-US" smtClean="0"/>
-              <a:t>2025/2/24</a:t>
+              <a:t>2025/2/26</a:t>
             </a:fld>
             <a:endParaRPr lang="zh-CN" altLang="en-US"/>
           </a:p>
@@ -1409,7 +1413,7 @@
           <a:p>
             <a:fld id="{3B8E4CC4-C9D5-4422-B2EF-7898FE601EFC}" type="datetimeFigureOut">
               <a:rPr lang="zh-CN" altLang="en-US" smtClean="0"/>
-              <a:t>2025/2/24</a:t>
+              <a:t>2025/2/26</a:t>
             </a:fld>
             <a:endParaRPr lang="zh-CN" altLang="en-US"/>
           </a:p>
@@ -1821,7 +1825,7 @@
           <a:p>
             <a:fld id="{3B8E4CC4-C9D5-4422-B2EF-7898FE601EFC}" type="datetimeFigureOut">
               <a:rPr lang="zh-CN" altLang="en-US" smtClean="0"/>
-              <a:t>2025/2/24</a:t>
+              <a:t>2025/2/26</a:t>
             </a:fld>
             <a:endParaRPr lang="zh-CN" altLang="en-US"/>
           </a:p>
@@ -1962,7 +1966,7 @@
           <a:p>
             <a:fld id="{3B8E4CC4-C9D5-4422-B2EF-7898FE601EFC}" type="datetimeFigureOut">
               <a:rPr lang="zh-CN" altLang="en-US" smtClean="0"/>
-              <a:t>2025/2/24</a:t>
+              <a:t>2025/2/26</a:t>
             </a:fld>
             <a:endParaRPr lang="zh-CN" altLang="en-US"/>
           </a:p>
@@ -2075,7 +2079,7 @@
           <a:p>
             <a:fld id="{3B8E4CC4-C9D5-4422-B2EF-7898FE601EFC}" type="datetimeFigureOut">
               <a:rPr lang="zh-CN" altLang="en-US" smtClean="0"/>
-              <a:t>2025/2/24</a:t>
+              <a:t>2025/2/26</a:t>
             </a:fld>
             <a:endParaRPr lang="zh-CN" altLang="en-US"/>
           </a:p>
@@ -2386,7 +2390,7 @@
           <a:p>
             <a:fld id="{3B8E4CC4-C9D5-4422-B2EF-7898FE601EFC}" type="datetimeFigureOut">
               <a:rPr lang="zh-CN" altLang="en-US" smtClean="0"/>
-              <a:t>2025/2/24</a:t>
+              <a:t>2025/2/26</a:t>
             </a:fld>
             <a:endParaRPr lang="zh-CN" altLang="en-US"/>
           </a:p>
@@ -2674,7 +2678,7 @@
           <a:p>
             <a:fld id="{3B8E4CC4-C9D5-4422-B2EF-7898FE601EFC}" type="datetimeFigureOut">
               <a:rPr lang="zh-CN" altLang="en-US" smtClean="0"/>
-              <a:t>2025/2/24</a:t>
+              <a:t>2025/2/26</a:t>
             </a:fld>
             <a:endParaRPr lang="zh-CN" altLang="en-US"/>
           </a:p>
@@ -2915,7 +2919,7 @@
           <a:p>
             <a:fld id="{3B8E4CC4-C9D5-4422-B2EF-7898FE601EFC}" type="datetimeFigureOut">
               <a:rPr lang="zh-CN" altLang="en-US" smtClean="0"/>
-              <a:t>2025/2/24</a:t>
+              <a:t>2025/2/26</a:t>
             </a:fld>
             <a:endParaRPr lang="zh-CN" altLang="en-US"/>
           </a:p>
@@ -3598,6 +3602,204 @@
 </p:sld>
 </file>
 
+<file path=ppt/slides/slide10.xml><?xml version="1.0" encoding="utf-8"?>
+<p:sld xmlns:a="http://schemas.openxmlformats.org/drawingml/2006/main" xmlns:r="http://schemas.openxmlformats.org/officeDocument/2006/relationships" xmlns:p="http://schemas.openxmlformats.org/presentationml/2006/main">
+  <p:cSld>
+    <p:spTree>
+      <p:nvGrpSpPr>
+        <p:cNvPr id="1" name=""/>
+        <p:cNvGrpSpPr/>
+        <p:nvPr/>
+      </p:nvGrpSpPr>
+      <p:grpSpPr>
+        <a:xfrm>
+          <a:off x="0" y="0"/>
+          <a:ext cx="0" cy="0"/>
+          <a:chOff x="0" y="0"/>
+          <a:chExt cx="0" cy="0"/>
+        </a:xfrm>
+      </p:grpSpPr>
+      <p:grpSp>
+        <p:nvGrpSpPr>
+          <p:cNvPr id="4" name="组合 3">
+            <a:extLst>
+              <a:ext uri="{FF2B5EF4-FFF2-40B4-BE49-F238E27FC236}">
+                <a16:creationId xmlns:a16="http://schemas.microsoft.com/office/drawing/2014/main" id="{A887BBB1-AC09-4623-ACD3-52DDC31FED77}"/>
+              </a:ext>
+            </a:extLst>
+          </p:cNvPr>
+          <p:cNvGrpSpPr/>
+          <p:nvPr/>
+        </p:nvGrpSpPr>
+        <p:grpSpPr>
+          <a:xfrm>
+            <a:off x="1352290" y="771776"/>
+            <a:ext cx="9671880" cy="2814974"/>
+            <a:chOff x="1352290" y="771776"/>
+            <a:chExt cx="9671880" cy="2814974"/>
+          </a:xfrm>
+        </p:grpSpPr>
+        <p:sp>
+          <p:nvSpPr>
+            <p:cNvPr id="11" name="文本框 10">
+              <a:extLst>
+                <a:ext uri="{FF2B5EF4-FFF2-40B4-BE49-F238E27FC236}">
+                  <a16:creationId xmlns:a16="http://schemas.microsoft.com/office/drawing/2014/main" id="{545522B9-98C9-4E52-9997-3AD7A27FC30C}"/>
+                </a:ext>
+              </a:extLst>
+            </p:cNvPr>
+            <p:cNvSpPr txBox="1"/>
+            <p:nvPr/>
+          </p:nvSpPr>
+          <p:spPr>
+            <a:xfrm>
+              <a:off x="4843195" y="968370"/>
+              <a:ext cx="6180975" cy="1785104"/>
+            </a:xfrm>
+            <a:prstGeom prst="rect">
+              <a:avLst/>
+            </a:prstGeom>
+            <a:noFill/>
+          </p:spPr>
+          <p:txBody>
+            <a:bodyPr wrap="square" rtlCol="0">
+              <a:spAutoFit/>
+            </a:bodyPr>
+            <a:lstStyle/>
+            <a:p>
+              <a:r>
+                <a:rPr lang="en-US" altLang="zh-CN" sz="11000" b="1">
+                  <a:solidFill>
+                    <a:srgbClr val="00A6ED"/>
+                  </a:solidFill>
+                  <a:latin typeface="Times New Roman" panose="02020603050405020304" pitchFamily="18" charset="0"/>
+                </a:rPr>
+                <a:t>[Problem]</a:t>
+              </a:r>
+              <a:endParaRPr lang="zh-CN" altLang="en-US" sz="11000" b="1">
+                <a:solidFill>
+                  <a:srgbClr val="00A6ED"/>
+                </a:solidFill>
+                <a:latin typeface="Times New Roman" panose="02020603050405020304" pitchFamily="18" charset="0"/>
+              </a:endParaRPr>
+            </a:p>
+          </p:txBody>
+        </p:sp>
+        <p:pic>
+          <p:nvPicPr>
+            <p:cNvPr id="6" name="图片 5">
+              <a:extLst>
+                <a:ext uri="{FF2B5EF4-FFF2-40B4-BE49-F238E27FC236}">
+                  <a16:creationId xmlns:a16="http://schemas.microsoft.com/office/drawing/2014/main" id="{2FAB5064-DAED-4642-9ECB-28312D7BA5EE}"/>
+                </a:ext>
+              </a:extLst>
+            </p:cNvPr>
+            <p:cNvPicPr>
+              <a:picLocks noChangeAspect="1"/>
+            </p:cNvPicPr>
+            <p:nvPr/>
+          </p:nvPicPr>
+          <p:blipFill rotWithShape="1">
+            <a:blip r:embed="rId2">
+              <a:extLst>
+                <a:ext uri="{28A0092B-C50C-407E-A947-70E740481C1C}">
+                  <a14:useLocalDpi xmlns:a14="http://schemas.microsoft.com/office/drawing/2010/main" val="0"/>
+                </a:ext>
+              </a:extLst>
+            </a:blip>
+            <a:srcRect t="2703" b="252"/>
+            <a:stretch/>
+          </p:blipFill>
+          <p:spPr>
+            <a:xfrm>
+              <a:off x="1352290" y="771776"/>
+              <a:ext cx="2900681" cy="2814974"/>
+            </a:xfrm>
+            <a:prstGeom prst="rect">
+              <a:avLst/>
+            </a:prstGeom>
+          </p:spPr>
+        </p:pic>
+      </p:grpSp>
+    </p:spTree>
+    <p:extLst>
+      <p:ext uri="{BB962C8B-B14F-4D97-AF65-F5344CB8AC3E}">
+        <p14:creationId xmlns:p14="http://schemas.microsoft.com/office/powerpoint/2010/main" val="2499641162"/>
+      </p:ext>
+    </p:extLst>
+  </p:cSld>
+  <p:clrMapOvr>
+    <a:masterClrMapping/>
+  </p:clrMapOvr>
+</p:sld>
+</file>
+
+<file path=ppt/slides/slide11.xml><?xml version="1.0" encoding="utf-8"?>
+<p:sld xmlns:a="http://schemas.openxmlformats.org/drawingml/2006/main" xmlns:r="http://schemas.openxmlformats.org/officeDocument/2006/relationships" xmlns:p="http://schemas.openxmlformats.org/presentationml/2006/main">
+  <p:cSld>
+    <p:spTree>
+      <p:nvGrpSpPr>
+        <p:cNvPr id="1" name=""/>
+        <p:cNvGrpSpPr/>
+        <p:nvPr/>
+      </p:nvGrpSpPr>
+      <p:grpSpPr>
+        <a:xfrm>
+          <a:off x="0" y="0"/>
+          <a:ext cx="0" cy="0"/>
+          <a:chOff x="0" y="0"/>
+          <a:chExt cx="0" cy="0"/>
+        </a:xfrm>
+      </p:grpSpPr>
+      <p:pic>
+        <p:nvPicPr>
+          <p:cNvPr id="3" name="图片 2">
+            <a:extLst>
+              <a:ext uri="{FF2B5EF4-FFF2-40B4-BE49-F238E27FC236}">
+                <a16:creationId xmlns:a16="http://schemas.microsoft.com/office/drawing/2014/main" id="{B9954355-2C60-4814-8F04-DC167FFF7399}"/>
+              </a:ext>
+            </a:extLst>
+          </p:cNvPr>
+          <p:cNvPicPr>
+            <a:picLocks noChangeAspect="1"/>
+          </p:cNvPicPr>
+          <p:nvPr/>
+        </p:nvPicPr>
+        <p:blipFill>
+          <a:blip r:embed="rId2">
+            <a:extLst>
+              <a:ext uri="{28A0092B-C50C-407E-A947-70E740481C1C}">
+                <a14:useLocalDpi xmlns:a14="http://schemas.microsoft.com/office/drawing/2010/main" val="0"/>
+              </a:ext>
+            </a:extLst>
+          </a:blip>
+          <a:stretch>
+            <a:fillRect/>
+          </a:stretch>
+        </p:blipFill>
+        <p:spPr>
+          <a:xfrm>
+            <a:off x="1218520" y="1175195"/>
+            <a:ext cx="2996114" cy="2996114"/>
+          </a:xfrm>
+          <a:prstGeom prst="rect">
+            <a:avLst/>
+          </a:prstGeom>
+        </p:spPr>
+      </p:pic>
+    </p:spTree>
+    <p:extLst>
+      <p:ext uri="{BB962C8B-B14F-4D97-AF65-F5344CB8AC3E}">
+        <p14:creationId xmlns:p14="http://schemas.microsoft.com/office/powerpoint/2010/main" val="3702243805"/>
+      </p:ext>
+    </p:extLst>
+  </p:cSld>
+  <p:clrMapOvr>
+    <a:masterClrMapping/>
+  </p:clrMapOvr>
+</p:sld>
+</file>
+
 <file path=ppt/slides/slide2.xml><?xml version="1.0" encoding="utf-8"?>
 <p:sld xmlns:a="http://schemas.openxmlformats.org/drawingml/2006/main" xmlns:r="http://schemas.openxmlformats.org/officeDocument/2006/relationships" xmlns:p="http://schemas.openxmlformats.org/presentationml/2006/main">
   <p:cSld>
@@ -4001,6 +4203,88 @@
           </p:txBody>
         </p:sp>
       </p:grpSp>
+      <p:pic>
+        <p:nvPicPr>
+          <p:cNvPr id="4" name="图片 3">
+            <a:extLst>
+              <a:ext uri="{FF2B5EF4-FFF2-40B4-BE49-F238E27FC236}">
+                <a16:creationId xmlns:a16="http://schemas.microsoft.com/office/drawing/2014/main" id="{462C2A80-60EB-4C3A-8F28-D4323FB2DE9E}"/>
+              </a:ext>
+            </a:extLst>
+          </p:cNvPr>
+          <p:cNvPicPr>
+            <a:picLocks noChangeAspect="1"/>
+          </p:cNvPicPr>
+          <p:nvPr/>
+        </p:nvPicPr>
+        <p:blipFill>
+          <a:blip r:embed="rId3">
+            <a:extLst>
+              <a:ext uri="{28A0092B-C50C-407E-A947-70E740481C1C}">
+                <a14:useLocalDpi xmlns:a14="http://schemas.microsoft.com/office/drawing/2010/main" val="0"/>
+              </a:ext>
+            </a:extLst>
+          </a:blip>
+          <a:stretch>
+            <a:fillRect/>
+          </a:stretch>
+        </p:blipFill>
+        <p:spPr>
+          <a:xfrm>
+            <a:off x="1251113" y="1119377"/>
+            <a:ext cx="3116020" cy="3116020"/>
+          </a:xfrm>
+          <a:prstGeom prst="rect">
+            <a:avLst/>
+          </a:prstGeom>
+        </p:spPr>
+      </p:pic>
+      <p:sp>
+        <p:nvSpPr>
+          <p:cNvPr id="8" name="矩形 7">
+            <a:extLst>
+              <a:ext uri="{FF2B5EF4-FFF2-40B4-BE49-F238E27FC236}">
+                <a16:creationId xmlns:a16="http://schemas.microsoft.com/office/drawing/2014/main" id="{41A4517A-C16B-4409-940B-8F1757C1620E}"/>
+              </a:ext>
+            </a:extLst>
+          </p:cNvPr>
+          <p:cNvSpPr/>
+          <p:nvPr/>
+        </p:nvSpPr>
+        <p:spPr>
+          <a:xfrm>
+            <a:off x="1352291" y="224287"/>
+            <a:ext cx="2900163" cy="2453100"/>
+          </a:xfrm>
+          <a:prstGeom prst="rect">
+            <a:avLst/>
+          </a:prstGeom>
+        </p:spPr>
+        <p:style>
+          <a:lnRef idx="2">
+            <a:schemeClr val="accent1">
+              <a:shade val="50000"/>
+            </a:schemeClr>
+          </a:lnRef>
+          <a:fillRef idx="1">
+            <a:schemeClr val="accent1"/>
+          </a:fillRef>
+          <a:effectRef idx="0">
+            <a:schemeClr val="accent1"/>
+          </a:effectRef>
+          <a:fontRef idx="minor">
+            <a:schemeClr val="lt1"/>
+          </a:fontRef>
+        </p:style>
+        <p:txBody>
+          <a:bodyPr rtlCol="0" anchor="ctr"/>
+          <a:lstStyle/>
+          <a:p>
+            <a:pPr algn="ctr"/>
+            <a:endParaRPr lang="zh-CN" altLang="en-US"/>
+          </a:p>
+        </p:txBody>
+      </p:sp>
     </p:spTree>
     <p:extLst>
       <p:ext uri="{BB962C8B-B14F-4D97-AF65-F5344CB8AC3E}">
@@ -4164,12 +4448,538 @@
           <a:chExt cx="0" cy="0"/>
         </a:xfrm>
       </p:grpSpPr>
+      <p:sp>
+        <p:nvSpPr>
+          <p:cNvPr id="10" name="文本框 9">
+            <a:extLst>
+              <a:ext uri="{FF2B5EF4-FFF2-40B4-BE49-F238E27FC236}">
+                <a16:creationId xmlns:a16="http://schemas.microsoft.com/office/drawing/2014/main" id="{9E4514DB-904F-482F-83A0-A387681F0DE6}"/>
+              </a:ext>
+            </a:extLst>
+          </p:cNvPr>
+          <p:cNvSpPr txBox="1"/>
+          <p:nvPr/>
+        </p:nvSpPr>
+        <p:spPr>
+          <a:xfrm>
+            <a:off x="4853470" y="892283"/>
+            <a:ext cx="3971258" cy="1785104"/>
+          </a:xfrm>
+          <a:prstGeom prst="rect">
+            <a:avLst/>
+          </a:prstGeom>
+          <a:noFill/>
+        </p:spPr>
+        <p:txBody>
+          <a:bodyPr wrap="square" rtlCol="0">
+            <a:spAutoFit/>
+          </a:bodyPr>
+          <a:lstStyle/>
+          <a:p>
+            <a:r>
+              <a:rPr lang="en-US" altLang="zh-CN" sz="11000" b="1">
+                <a:solidFill>
+                  <a:srgbClr val="B733DB"/>
+                </a:solidFill>
+                <a:latin typeface="Times New Roman" panose="02020603050405020304" pitchFamily="18" charset="0"/>
+              </a:rPr>
+              <a:t>[Code]</a:t>
+            </a:r>
+            <a:endParaRPr lang="zh-CN" altLang="en-US" sz="11000" b="1">
+              <a:solidFill>
+                <a:srgbClr val="B733DB"/>
+              </a:solidFill>
+              <a:latin typeface="Times New Roman" panose="02020603050405020304" pitchFamily="18" charset="0"/>
+            </a:endParaRPr>
+          </a:p>
+        </p:txBody>
+      </p:sp>
+      <p:pic>
+        <p:nvPicPr>
+          <p:cNvPr id="8" name="图片 7">
+            <a:extLst>
+              <a:ext uri="{FF2B5EF4-FFF2-40B4-BE49-F238E27FC236}">
+                <a16:creationId xmlns:a16="http://schemas.microsoft.com/office/drawing/2014/main" id="{6C69173B-B3CE-4DC5-91FE-0CC3C3880240}"/>
+              </a:ext>
+            </a:extLst>
+          </p:cNvPr>
+          <p:cNvPicPr>
+            <a:picLocks noChangeAspect="1"/>
+          </p:cNvPicPr>
+          <p:nvPr/>
+        </p:nvPicPr>
+        <p:blipFill>
+          <a:blip r:embed="rId2">
+            <a:extLst>
+              <a:ext uri="{28A0092B-C50C-407E-A947-70E740481C1C}">
+                <a14:useLocalDpi xmlns:a14="http://schemas.microsoft.com/office/drawing/2010/main" val="0"/>
+              </a:ext>
+            </a:extLst>
+          </a:blip>
+          <a:stretch>
+            <a:fillRect/>
+          </a:stretch>
+        </p:blipFill>
+        <p:spPr>
+          <a:xfrm>
+            <a:off x="1195684" y="892283"/>
+            <a:ext cx="3161617" cy="3161617"/>
+          </a:xfrm>
+          <a:prstGeom prst="rect">
+            <a:avLst/>
+          </a:prstGeom>
+        </p:spPr>
+      </p:pic>
+    </p:spTree>
+    <p:extLst>
+      <p:ext uri="{BB962C8B-B14F-4D97-AF65-F5344CB8AC3E}">
+        <p14:creationId xmlns:p14="http://schemas.microsoft.com/office/powerpoint/2010/main" val="1306292178"/>
+      </p:ext>
+    </p:extLst>
+  </p:cSld>
+  <p:clrMapOvr>
+    <a:masterClrMapping/>
+  </p:clrMapOvr>
+</p:sld>
+</file>
+
+<file path=ppt/slides/slide6.xml><?xml version="1.0" encoding="utf-8"?>
+<p:sld xmlns:a="http://schemas.openxmlformats.org/drawingml/2006/main" xmlns:r="http://schemas.openxmlformats.org/officeDocument/2006/relationships" xmlns:p="http://schemas.openxmlformats.org/presentationml/2006/main">
+  <p:cSld>
+    <p:spTree>
+      <p:nvGrpSpPr>
+        <p:cNvPr id="1" name=""/>
+        <p:cNvGrpSpPr/>
+        <p:nvPr/>
+      </p:nvGrpSpPr>
+      <p:grpSpPr>
+        <a:xfrm>
+          <a:off x="0" y="0"/>
+          <a:ext cx="0" cy="0"/>
+          <a:chOff x="0" y="0"/>
+          <a:chExt cx="0" cy="0"/>
+        </a:xfrm>
+      </p:grpSpPr>
+      <p:pic>
+        <p:nvPicPr>
+          <p:cNvPr id="5" name="图片 4">
+            <a:extLst>
+              <a:ext uri="{FF2B5EF4-FFF2-40B4-BE49-F238E27FC236}">
+                <a16:creationId xmlns:a16="http://schemas.microsoft.com/office/drawing/2014/main" id="{E3AB534A-5787-42E7-BDDB-4F4BA54D42B3}"/>
+              </a:ext>
+            </a:extLst>
+          </p:cNvPr>
+          <p:cNvPicPr>
+            <a:picLocks noChangeAspect="1"/>
+          </p:cNvPicPr>
+          <p:nvPr/>
+        </p:nvPicPr>
+        <p:blipFill>
+          <a:blip r:embed="rId2">
+            <a:extLst>
+              <a:ext uri="{28A0092B-C50C-407E-A947-70E740481C1C}">
+                <a14:useLocalDpi xmlns:a14="http://schemas.microsoft.com/office/drawing/2010/main" val="0"/>
+              </a:ext>
+            </a:extLst>
+          </a:blip>
+          <a:stretch>
+            <a:fillRect/>
+          </a:stretch>
+        </p:blipFill>
+        <p:spPr>
+          <a:xfrm>
+            <a:off x="1352291" y="581230"/>
+            <a:ext cx="2900163" cy="2900163"/>
+          </a:xfrm>
+          <a:prstGeom prst="rect">
+            <a:avLst/>
+          </a:prstGeom>
+        </p:spPr>
+      </p:pic>
+      <p:sp>
+        <p:nvSpPr>
+          <p:cNvPr id="10" name="文本框 9">
+            <a:extLst>
+              <a:ext uri="{FF2B5EF4-FFF2-40B4-BE49-F238E27FC236}">
+                <a16:creationId xmlns:a16="http://schemas.microsoft.com/office/drawing/2014/main" id="{9E4514DB-904F-482F-83A0-A387681F0DE6}"/>
+              </a:ext>
+            </a:extLst>
+          </p:cNvPr>
+          <p:cNvSpPr txBox="1"/>
+          <p:nvPr/>
+        </p:nvSpPr>
+        <p:spPr>
+          <a:xfrm>
+            <a:off x="4853470" y="892283"/>
+            <a:ext cx="3971258" cy="1785104"/>
+          </a:xfrm>
+          <a:prstGeom prst="rect">
+            <a:avLst/>
+          </a:prstGeom>
+          <a:noFill/>
+        </p:spPr>
+        <p:txBody>
+          <a:bodyPr wrap="square" rtlCol="0">
+            <a:spAutoFit/>
+          </a:bodyPr>
+          <a:lstStyle/>
+          <a:p>
+            <a:r>
+              <a:rPr lang="en-US" altLang="zh-CN" sz="11000" b="1">
+                <a:solidFill>
+                  <a:srgbClr val="00A6ED"/>
+                </a:solidFill>
+                <a:latin typeface="Times New Roman" panose="02020603050405020304" pitchFamily="18" charset="0"/>
+              </a:rPr>
+              <a:t>[PDF]</a:t>
+            </a:r>
+            <a:endParaRPr lang="zh-CN" altLang="en-US" sz="11000" b="1">
+              <a:solidFill>
+                <a:srgbClr val="00A6ED"/>
+              </a:solidFill>
+              <a:latin typeface="Times New Roman" panose="02020603050405020304" pitchFamily="18" charset="0"/>
+            </a:endParaRPr>
+          </a:p>
+        </p:txBody>
+      </p:sp>
+      <p:pic>
+        <p:nvPicPr>
+          <p:cNvPr id="6" name="图片 5">
+            <a:extLst>
+              <a:ext uri="{FF2B5EF4-FFF2-40B4-BE49-F238E27FC236}">
+                <a16:creationId xmlns:a16="http://schemas.microsoft.com/office/drawing/2014/main" id="{CEBC15D3-C6B9-4C4A-8FC8-D3EAE6E1F484}"/>
+              </a:ext>
+            </a:extLst>
+          </p:cNvPr>
+          <p:cNvPicPr>
+            <a:picLocks noChangeAspect="1"/>
+          </p:cNvPicPr>
+          <p:nvPr/>
+        </p:nvPicPr>
+        <p:blipFill>
+          <a:blip r:embed="rId3">
+            <a:extLst>
+              <a:ext uri="{28A0092B-C50C-407E-A947-70E740481C1C}">
+                <a14:useLocalDpi xmlns:a14="http://schemas.microsoft.com/office/drawing/2010/main" val="0"/>
+              </a:ext>
+            </a:extLst>
+          </a:blip>
+          <a:stretch>
+            <a:fillRect/>
+          </a:stretch>
+        </p:blipFill>
+        <p:spPr>
+          <a:xfrm>
+            <a:off x="1221563" y="450502"/>
+            <a:ext cx="3161617" cy="3161617"/>
+          </a:xfrm>
+          <a:prstGeom prst="rect">
+            <a:avLst/>
+          </a:prstGeom>
+        </p:spPr>
+      </p:pic>
+    </p:spTree>
+    <p:extLst>
+      <p:ext uri="{BB962C8B-B14F-4D97-AF65-F5344CB8AC3E}">
+        <p14:creationId xmlns:p14="http://schemas.microsoft.com/office/powerpoint/2010/main" val="4143147384"/>
+      </p:ext>
+    </p:extLst>
+  </p:cSld>
+  <p:clrMapOvr>
+    <a:masterClrMapping/>
+  </p:clrMapOvr>
+</p:sld>
+</file>
+
+<file path=ppt/slides/slide7.xml><?xml version="1.0" encoding="utf-8"?>
+<p:sld xmlns:a="http://schemas.openxmlformats.org/drawingml/2006/main" xmlns:r="http://schemas.openxmlformats.org/officeDocument/2006/relationships" xmlns:p="http://schemas.openxmlformats.org/presentationml/2006/main">
+  <p:cSld>
+    <p:spTree>
+      <p:nvGrpSpPr>
+        <p:cNvPr id="1" name=""/>
+        <p:cNvGrpSpPr/>
+        <p:nvPr/>
+      </p:nvGrpSpPr>
+      <p:grpSpPr>
+        <a:xfrm>
+          <a:off x="0" y="0"/>
+          <a:ext cx="0" cy="0"/>
+          <a:chOff x="0" y="0"/>
+          <a:chExt cx="0" cy="0"/>
+        </a:xfrm>
+      </p:grpSpPr>
       <p:grpSp>
         <p:nvGrpSpPr>
           <p:cNvPr id="2" name="组合 1">
             <a:extLst>
               <a:ext uri="{FF2B5EF4-FFF2-40B4-BE49-F238E27FC236}">
-                <a16:creationId xmlns:a16="http://schemas.microsoft.com/office/drawing/2014/main" id="{E57A198E-8DEA-46EA-BBA0-CFFFF4711D24}"/>
+                <a16:creationId xmlns:a16="http://schemas.microsoft.com/office/drawing/2014/main" id="{6AAF3369-1E3D-4EBF-AE8B-588B34F47BBA}"/>
+              </a:ext>
+            </a:extLst>
+          </p:cNvPr>
+          <p:cNvGrpSpPr/>
+          <p:nvPr/>
+        </p:nvGrpSpPr>
+        <p:grpSpPr>
+          <a:xfrm>
+            <a:off x="1221563" y="450502"/>
+            <a:ext cx="7603165" cy="3161617"/>
+            <a:chOff x="1221563" y="450502"/>
+            <a:chExt cx="7603165" cy="3161617"/>
+          </a:xfrm>
+        </p:grpSpPr>
+        <p:sp>
+          <p:nvSpPr>
+            <p:cNvPr id="10" name="文本框 9">
+              <a:extLst>
+                <a:ext uri="{FF2B5EF4-FFF2-40B4-BE49-F238E27FC236}">
+                  <a16:creationId xmlns:a16="http://schemas.microsoft.com/office/drawing/2014/main" id="{9E4514DB-904F-482F-83A0-A387681F0DE6}"/>
+                </a:ext>
+              </a:extLst>
+            </p:cNvPr>
+            <p:cNvSpPr txBox="1"/>
+            <p:nvPr/>
+          </p:nvSpPr>
+          <p:spPr>
+            <a:xfrm>
+              <a:off x="4853470" y="892283"/>
+              <a:ext cx="3971258" cy="1785104"/>
+            </a:xfrm>
+            <a:prstGeom prst="rect">
+              <a:avLst/>
+            </a:prstGeom>
+            <a:noFill/>
+          </p:spPr>
+          <p:txBody>
+            <a:bodyPr wrap="square" rtlCol="0">
+              <a:spAutoFit/>
+            </a:bodyPr>
+            <a:lstStyle/>
+            <a:p>
+              <a:r>
+                <a:rPr lang="en-US" altLang="zh-CN" sz="11000" b="1">
+                  <a:solidFill>
+                    <a:srgbClr val="00A6ED"/>
+                  </a:solidFill>
+                  <a:latin typeface="Times New Roman" panose="02020603050405020304" pitchFamily="18" charset="0"/>
+                </a:rPr>
+                <a:t>[PDF]</a:t>
+              </a:r>
+              <a:endParaRPr lang="zh-CN" altLang="en-US" sz="11000" b="1">
+                <a:solidFill>
+                  <a:srgbClr val="00A6ED"/>
+                </a:solidFill>
+                <a:latin typeface="Times New Roman" panose="02020603050405020304" pitchFamily="18" charset="0"/>
+              </a:endParaRPr>
+            </a:p>
+          </p:txBody>
+        </p:sp>
+        <p:pic>
+          <p:nvPicPr>
+            <p:cNvPr id="7" name="图片 6">
+              <a:extLst>
+                <a:ext uri="{FF2B5EF4-FFF2-40B4-BE49-F238E27FC236}">
+                  <a16:creationId xmlns:a16="http://schemas.microsoft.com/office/drawing/2014/main" id="{CFF49DFA-8706-4D1C-A561-CFF0F936A664}"/>
+                </a:ext>
+              </a:extLst>
+            </p:cNvPr>
+            <p:cNvPicPr>
+              <a:picLocks noChangeAspect="1"/>
+            </p:cNvPicPr>
+            <p:nvPr/>
+          </p:nvPicPr>
+          <p:blipFill>
+            <a:blip r:embed="rId2">
+              <a:extLst>
+                <a:ext uri="{28A0092B-C50C-407E-A947-70E740481C1C}">
+                  <a14:useLocalDpi xmlns:a14="http://schemas.microsoft.com/office/drawing/2010/main" val="0"/>
+                </a:ext>
+              </a:extLst>
+            </a:blip>
+            <a:stretch>
+              <a:fillRect/>
+            </a:stretch>
+          </p:blipFill>
+          <p:spPr>
+            <a:xfrm>
+              <a:off x="1221563" y="450502"/>
+              <a:ext cx="3161617" cy="3161617"/>
+            </a:xfrm>
+            <a:prstGeom prst="rect">
+              <a:avLst/>
+            </a:prstGeom>
+          </p:spPr>
+        </p:pic>
+      </p:grpSp>
+    </p:spTree>
+    <p:extLst>
+      <p:ext uri="{BB962C8B-B14F-4D97-AF65-F5344CB8AC3E}">
+        <p14:creationId xmlns:p14="http://schemas.microsoft.com/office/powerpoint/2010/main" val="1759978810"/>
+      </p:ext>
+    </p:extLst>
+  </p:cSld>
+  <p:clrMapOvr>
+    <a:masterClrMapping/>
+  </p:clrMapOvr>
+</p:sld>
+</file>
+
+<file path=ppt/slides/slide8.xml><?xml version="1.0" encoding="utf-8"?>
+<p:sld xmlns:a="http://schemas.openxmlformats.org/drawingml/2006/main" xmlns:r="http://schemas.openxmlformats.org/officeDocument/2006/relationships" xmlns:p="http://schemas.openxmlformats.org/presentationml/2006/main">
+  <p:cSld>
+    <p:spTree>
+      <p:nvGrpSpPr>
+        <p:cNvPr id="1" name=""/>
+        <p:cNvGrpSpPr/>
+        <p:nvPr/>
+      </p:nvGrpSpPr>
+      <p:grpSpPr>
+        <a:xfrm>
+          <a:off x="0" y="0"/>
+          <a:ext cx="0" cy="0"/>
+          <a:chOff x="0" y="0"/>
+          <a:chExt cx="0" cy="0"/>
+        </a:xfrm>
+      </p:grpSpPr>
+      <p:grpSp>
+        <p:nvGrpSpPr>
+          <p:cNvPr id="2" name="组合 1">
+            <a:extLst>
+              <a:ext uri="{FF2B5EF4-FFF2-40B4-BE49-F238E27FC236}">
+                <a16:creationId xmlns:a16="http://schemas.microsoft.com/office/drawing/2014/main" id="{64FE400F-2494-4E54-B97A-6E7DA4993D6C}"/>
+              </a:ext>
+            </a:extLst>
+          </p:cNvPr>
+          <p:cNvGrpSpPr/>
+          <p:nvPr/>
+        </p:nvGrpSpPr>
+        <p:grpSpPr>
+          <a:xfrm>
+            <a:off x="1352291" y="581230"/>
+            <a:ext cx="7472437" cy="2900163"/>
+            <a:chOff x="1352291" y="581230"/>
+            <a:chExt cx="7472437" cy="2900163"/>
+          </a:xfrm>
+        </p:grpSpPr>
+        <p:pic>
+          <p:nvPicPr>
+            <p:cNvPr id="5" name="图片 4">
+              <a:extLst>
+                <a:ext uri="{FF2B5EF4-FFF2-40B4-BE49-F238E27FC236}">
+                  <a16:creationId xmlns:a16="http://schemas.microsoft.com/office/drawing/2014/main" id="{E3AB534A-5787-42E7-BDDB-4F4BA54D42B3}"/>
+                </a:ext>
+              </a:extLst>
+            </p:cNvPr>
+            <p:cNvPicPr>
+              <a:picLocks noChangeAspect="1"/>
+            </p:cNvPicPr>
+            <p:nvPr/>
+          </p:nvPicPr>
+          <p:blipFill>
+            <a:blip r:embed="rId2">
+              <a:extLst>
+                <a:ext uri="{28A0092B-C50C-407E-A947-70E740481C1C}">
+                  <a14:useLocalDpi xmlns:a14="http://schemas.microsoft.com/office/drawing/2010/main" val="0"/>
+                </a:ext>
+              </a:extLst>
+            </a:blip>
+            <a:stretch>
+              <a:fillRect/>
+            </a:stretch>
+          </p:blipFill>
+          <p:spPr>
+            <a:xfrm>
+              <a:off x="1352291" y="581230"/>
+              <a:ext cx="2900163" cy="2900163"/>
+            </a:xfrm>
+            <a:prstGeom prst="rect">
+              <a:avLst/>
+            </a:prstGeom>
+          </p:spPr>
+        </p:pic>
+        <p:sp>
+          <p:nvSpPr>
+            <p:cNvPr id="10" name="文本框 9">
+              <a:extLst>
+                <a:ext uri="{FF2B5EF4-FFF2-40B4-BE49-F238E27FC236}">
+                  <a16:creationId xmlns:a16="http://schemas.microsoft.com/office/drawing/2014/main" id="{9E4514DB-904F-482F-83A0-A387681F0DE6}"/>
+                </a:ext>
+              </a:extLst>
+            </p:cNvPr>
+            <p:cNvSpPr txBox="1"/>
+            <p:nvPr/>
+          </p:nvSpPr>
+          <p:spPr>
+            <a:xfrm>
+              <a:off x="4853470" y="892283"/>
+              <a:ext cx="3971258" cy="1785104"/>
+            </a:xfrm>
+            <a:prstGeom prst="rect">
+              <a:avLst/>
+            </a:prstGeom>
+            <a:noFill/>
+          </p:spPr>
+          <p:txBody>
+            <a:bodyPr wrap="square" rtlCol="0">
+              <a:spAutoFit/>
+            </a:bodyPr>
+            <a:lstStyle/>
+            <a:p>
+              <a:r>
+                <a:rPr lang="en-US" altLang="zh-CN" sz="11000" b="1">
+                  <a:solidFill>
+                    <a:srgbClr val="00A6ED"/>
+                  </a:solidFill>
+                  <a:latin typeface="Times New Roman" panose="02020603050405020304" pitchFamily="18" charset="0"/>
+                </a:rPr>
+                <a:t>[Code]</a:t>
+              </a:r>
+              <a:endParaRPr lang="zh-CN" altLang="en-US" sz="11000" b="1">
+                <a:solidFill>
+                  <a:srgbClr val="00A6ED"/>
+                </a:solidFill>
+                <a:latin typeface="Times New Roman" panose="02020603050405020304" pitchFamily="18" charset="0"/>
+              </a:endParaRPr>
+            </a:p>
+          </p:txBody>
+        </p:sp>
+      </p:grpSp>
+    </p:spTree>
+    <p:extLst>
+      <p:ext uri="{BB962C8B-B14F-4D97-AF65-F5344CB8AC3E}">
+        <p14:creationId xmlns:p14="http://schemas.microsoft.com/office/powerpoint/2010/main" val="1258824461"/>
+      </p:ext>
+    </p:extLst>
+  </p:cSld>
+  <p:clrMapOvr>
+    <a:masterClrMapping/>
+  </p:clrMapOvr>
+</p:sld>
+</file>
+
+<file path=ppt/slides/slide9.xml><?xml version="1.0" encoding="utf-8"?>
+<p:sld xmlns:a="http://schemas.openxmlformats.org/drawingml/2006/main" xmlns:r="http://schemas.openxmlformats.org/officeDocument/2006/relationships" xmlns:p="http://schemas.openxmlformats.org/presentationml/2006/main">
+  <p:cSld>
+    <p:spTree>
+      <p:nvGrpSpPr>
+        <p:cNvPr id="1" name=""/>
+        <p:cNvGrpSpPr/>
+        <p:nvPr/>
+      </p:nvGrpSpPr>
+      <p:grpSpPr>
+        <a:xfrm>
+          <a:off x="0" y="0"/>
+          <a:ext cx="0" cy="0"/>
+          <a:chOff x="0" y="0"/>
+          <a:chExt cx="0" cy="0"/>
+        </a:xfrm>
+      </p:grpSpPr>
+      <p:grpSp>
+        <p:nvGrpSpPr>
+          <p:cNvPr id="4" name="组合 3">
+            <a:extLst>
+              <a:ext uri="{FF2B5EF4-FFF2-40B4-BE49-F238E27FC236}">
+                <a16:creationId xmlns:a16="http://schemas.microsoft.com/office/drawing/2014/main" id="{E0CDD178-3486-4474-B3DB-9AF33205B01E}"/>
               </a:ext>
             </a:extLst>
           </p:cNvPr>
@@ -4179,9 +4989,9 @@
         <p:grpSpPr>
           <a:xfrm>
             <a:off x="1352290" y="771775"/>
-            <a:ext cx="7462164" cy="2810784"/>
+            <a:ext cx="11804910" cy="2810784"/>
             <a:chOff x="1352290" y="771775"/>
-            <a:chExt cx="7462164" cy="2810784"/>
+            <a:chExt cx="11804910" cy="2810784"/>
           </a:xfrm>
         </p:grpSpPr>
         <p:pic>
@@ -4235,7 +5045,7 @@
           <p:spPr>
             <a:xfrm>
               <a:off x="4843196" y="968370"/>
-              <a:ext cx="3971258" cy="1785104"/>
+              <a:ext cx="8314004" cy="1785104"/>
             </a:xfrm>
             <a:prstGeom prst="rect">
               <a:avLst/>
@@ -4251,15 +5061,15 @@
               <a:r>
                 <a:rPr lang="en-US" altLang="zh-CN" sz="11000" b="1">
                   <a:solidFill>
-                    <a:srgbClr val="B733DB"/>
+                    <a:srgbClr val="00A6ED"/>
                   </a:solidFill>
                   <a:latin typeface="Times New Roman" panose="02020603050405020304" pitchFamily="18" charset="0"/>
                 </a:rPr>
-                <a:t>[Page]</a:t>
+                <a:t>[Project Page]</a:t>
               </a:r>
               <a:endParaRPr lang="zh-CN" altLang="en-US" sz="11000" b="1">
                 <a:solidFill>
-                  <a:srgbClr val="B733DB"/>
+                  <a:srgbClr val="00A6ED"/>
                 </a:solidFill>
                 <a:latin typeface="Times New Roman" panose="02020603050405020304" pitchFamily="18" charset="0"/>
               </a:endParaRPr>
@@ -4271,204 +5081,6 @@
     <p:extLst>
       <p:ext uri="{BB962C8B-B14F-4D97-AF65-F5344CB8AC3E}">
         <p14:creationId xmlns:p14="http://schemas.microsoft.com/office/powerpoint/2010/main" val="2738170423"/>
-      </p:ext>
-    </p:extLst>
-  </p:cSld>
-  <p:clrMapOvr>
-    <a:masterClrMapping/>
-  </p:clrMapOvr>
-</p:sld>
-</file>
-
-<file path=ppt/slides/slide6.xml><?xml version="1.0" encoding="utf-8"?>
-<p:sld xmlns:a="http://schemas.openxmlformats.org/drawingml/2006/main" xmlns:r="http://schemas.openxmlformats.org/officeDocument/2006/relationships" xmlns:p="http://schemas.openxmlformats.org/presentationml/2006/main">
-  <p:cSld>
-    <p:spTree>
-      <p:nvGrpSpPr>
-        <p:cNvPr id="1" name=""/>
-        <p:cNvGrpSpPr/>
-        <p:nvPr/>
-      </p:nvGrpSpPr>
-      <p:grpSpPr>
-        <a:xfrm>
-          <a:off x="0" y="0"/>
-          <a:ext cx="0" cy="0"/>
-          <a:chOff x="0" y="0"/>
-          <a:chExt cx="0" cy="0"/>
-        </a:xfrm>
-      </p:grpSpPr>
-      <p:grpSp>
-        <p:nvGrpSpPr>
-          <p:cNvPr id="4" name="组合 3">
-            <a:extLst>
-              <a:ext uri="{FF2B5EF4-FFF2-40B4-BE49-F238E27FC236}">
-                <a16:creationId xmlns:a16="http://schemas.microsoft.com/office/drawing/2014/main" id="{A887BBB1-AC09-4623-ACD3-52DDC31FED77}"/>
-              </a:ext>
-            </a:extLst>
-          </p:cNvPr>
-          <p:cNvGrpSpPr/>
-          <p:nvPr/>
-        </p:nvGrpSpPr>
-        <p:grpSpPr>
-          <a:xfrm>
-            <a:off x="1352290" y="771776"/>
-            <a:ext cx="9671880" cy="2814974"/>
-            <a:chOff x="1352290" y="771776"/>
-            <a:chExt cx="9671880" cy="2814974"/>
-          </a:xfrm>
-        </p:grpSpPr>
-        <p:sp>
-          <p:nvSpPr>
-            <p:cNvPr id="11" name="文本框 10">
-              <a:extLst>
-                <a:ext uri="{FF2B5EF4-FFF2-40B4-BE49-F238E27FC236}">
-                  <a16:creationId xmlns:a16="http://schemas.microsoft.com/office/drawing/2014/main" id="{545522B9-98C9-4E52-9997-3AD7A27FC30C}"/>
-                </a:ext>
-              </a:extLst>
-            </p:cNvPr>
-            <p:cNvSpPr txBox="1"/>
-            <p:nvPr/>
-          </p:nvSpPr>
-          <p:spPr>
-            <a:xfrm>
-              <a:off x="4843195" y="968370"/>
-              <a:ext cx="6180975" cy="1785104"/>
-            </a:xfrm>
-            <a:prstGeom prst="rect">
-              <a:avLst/>
-            </a:prstGeom>
-            <a:noFill/>
-          </p:spPr>
-          <p:txBody>
-            <a:bodyPr wrap="square" rtlCol="0">
-              <a:spAutoFit/>
-            </a:bodyPr>
-            <a:lstStyle/>
-            <a:p>
-              <a:r>
-                <a:rPr lang="en-US" altLang="zh-CN" sz="11000" b="1">
-                  <a:solidFill>
-                    <a:srgbClr val="B733DB"/>
-                  </a:solidFill>
-                  <a:latin typeface="Times New Roman" panose="02020603050405020304" pitchFamily="18" charset="0"/>
-                </a:rPr>
-                <a:t>[Problem]</a:t>
-              </a:r>
-              <a:endParaRPr lang="zh-CN" altLang="en-US" sz="11000" b="1">
-                <a:solidFill>
-                  <a:srgbClr val="B733DB"/>
-                </a:solidFill>
-                <a:latin typeface="Times New Roman" panose="02020603050405020304" pitchFamily="18" charset="0"/>
-              </a:endParaRPr>
-            </a:p>
-          </p:txBody>
-        </p:sp>
-        <p:pic>
-          <p:nvPicPr>
-            <p:cNvPr id="6" name="图片 5">
-              <a:extLst>
-                <a:ext uri="{FF2B5EF4-FFF2-40B4-BE49-F238E27FC236}">
-                  <a16:creationId xmlns:a16="http://schemas.microsoft.com/office/drawing/2014/main" id="{2FAB5064-DAED-4642-9ECB-28312D7BA5EE}"/>
-                </a:ext>
-              </a:extLst>
-            </p:cNvPr>
-            <p:cNvPicPr>
-              <a:picLocks noChangeAspect="1"/>
-            </p:cNvPicPr>
-            <p:nvPr/>
-          </p:nvPicPr>
-          <p:blipFill rotWithShape="1">
-            <a:blip r:embed="rId2">
-              <a:extLst>
-                <a:ext uri="{28A0092B-C50C-407E-A947-70E740481C1C}">
-                  <a14:useLocalDpi xmlns:a14="http://schemas.microsoft.com/office/drawing/2010/main" val="0"/>
-                </a:ext>
-              </a:extLst>
-            </a:blip>
-            <a:srcRect t="2703" b="252"/>
-            <a:stretch/>
-          </p:blipFill>
-          <p:spPr>
-            <a:xfrm>
-              <a:off x="1352290" y="771776"/>
-              <a:ext cx="2900681" cy="2814974"/>
-            </a:xfrm>
-            <a:prstGeom prst="rect">
-              <a:avLst/>
-            </a:prstGeom>
-          </p:spPr>
-        </p:pic>
-      </p:grpSp>
-    </p:spTree>
-    <p:extLst>
-      <p:ext uri="{BB962C8B-B14F-4D97-AF65-F5344CB8AC3E}">
-        <p14:creationId xmlns:p14="http://schemas.microsoft.com/office/powerpoint/2010/main" val="2499641162"/>
-      </p:ext>
-    </p:extLst>
-  </p:cSld>
-  <p:clrMapOvr>
-    <a:masterClrMapping/>
-  </p:clrMapOvr>
-</p:sld>
-</file>
-
-<file path=ppt/slides/slide7.xml><?xml version="1.0" encoding="utf-8"?>
-<p:sld xmlns:a="http://schemas.openxmlformats.org/drawingml/2006/main" xmlns:r="http://schemas.openxmlformats.org/officeDocument/2006/relationships" xmlns:p="http://schemas.openxmlformats.org/presentationml/2006/main">
-  <p:cSld>
-    <p:spTree>
-      <p:nvGrpSpPr>
-        <p:cNvPr id="1" name=""/>
-        <p:cNvGrpSpPr/>
-        <p:nvPr/>
-      </p:nvGrpSpPr>
-      <p:grpSpPr>
-        <a:xfrm>
-          <a:off x="0" y="0"/>
-          <a:ext cx="0" cy="0"/>
-          <a:chOff x="0" y="0"/>
-          <a:chExt cx="0" cy="0"/>
-        </a:xfrm>
-      </p:grpSpPr>
-      <p:pic>
-        <p:nvPicPr>
-          <p:cNvPr id="3" name="图片 2">
-            <a:extLst>
-              <a:ext uri="{FF2B5EF4-FFF2-40B4-BE49-F238E27FC236}">
-                <a16:creationId xmlns:a16="http://schemas.microsoft.com/office/drawing/2014/main" id="{B9954355-2C60-4814-8F04-DC167FFF7399}"/>
-              </a:ext>
-            </a:extLst>
-          </p:cNvPr>
-          <p:cNvPicPr>
-            <a:picLocks noChangeAspect="1"/>
-          </p:cNvPicPr>
-          <p:nvPr/>
-        </p:nvPicPr>
-        <p:blipFill>
-          <a:blip r:embed="rId2">
-            <a:extLst>
-              <a:ext uri="{28A0092B-C50C-407E-A947-70E740481C1C}">
-                <a14:useLocalDpi xmlns:a14="http://schemas.microsoft.com/office/drawing/2010/main" val="0"/>
-              </a:ext>
-            </a:extLst>
-          </a:blip>
-          <a:stretch>
-            <a:fillRect/>
-          </a:stretch>
-        </p:blipFill>
-        <p:spPr>
-          <a:xfrm>
-            <a:off x="1218520" y="1175195"/>
-            <a:ext cx="2996114" cy="2996114"/>
-          </a:xfrm>
-          <a:prstGeom prst="rect">
-            <a:avLst/>
-          </a:prstGeom>
-        </p:spPr>
-      </p:pic>
-    </p:spTree>
-    <p:extLst>
-      <p:ext uri="{BB962C8B-B14F-4D97-AF65-F5344CB8AC3E}">
-        <p14:creationId xmlns:p14="http://schemas.microsoft.com/office/powerpoint/2010/main" val="3702243805"/>
       </p:ext>
     </p:extLst>
   </p:cSld>

</xml_diff>

<commit_message>
Update images, links, and icons in resume index.html
</commit_message>
<xml_diff>
--- a/materials/ppt_template.pptx
+++ b/materials/ppt_template.pptx
@@ -269,7 +269,7 @@
           <a:p>
             <a:fld id="{3B8E4CC4-C9D5-4422-B2EF-7898FE601EFC}" type="datetimeFigureOut">
               <a:rPr lang="zh-CN" altLang="en-US" smtClean="0"/>
-              <a:t>2025/2/26</a:t>
+              <a:t>2025/6/26</a:t>
             </a:fld>
             <a:endParaRPr lang="zh-CN" altLang="en-US"/>
           </a:p>
@@ -467,7 +467,7 @@
           <a:p>
             <a:fld id="{3B8E4CC4-C9D5-4422-B2EF-7898FE601EFC}" type="datetimeFigureOut">
               <a:rPr lang="zh-CN" altLang="en-US" smtClean="0"/>
-              <a:t>2025/2/26</a:t>
+              <a:t>2025/6/26</a:t>
             </a:fld>
             <a:endParaRPr lang="zh-CN" altLang="en-US"/>
           </a:p>
@@ -675,7 +675,7 @@
           <a:p>
             <a:fld id="{3B8E4CC4-C9D5-4422-B2EF-7898FE601EFC}" type="datetimeFigureOut">
               <a:rPr lang="zh-CN" altLang="en-US" smtClean="0"/>
-              <a:t>2025/2/26</a:t>
+              <a:t>2025/6/26</a:t>
             </a:fld>
             <a:endParaRPr lang="zh-CN" altLang="en-US"/>
           </a:p>
@@ -873,7 +873,7 @@
           <a:p>
             <a:fld id="{3B8E4CC4-C9D5-4422-B2EF-7898FE601EFC}" type="datetimeFigureOut">
               <a:rPr lang="zh-CN" altLang="en-US" smtClean="0"/>
-              <a:t>2025/2/26</a:t>
+              <a:t>2025/6/26</a:t>
             </a:fld>
             <a:endParaRPr lang="zh-CN" altLang="en-US"/>
           </a:p>
@@ -1148,7 +1148,7 @@
           <a:p>
             <a:fld id="{3B8E4CC4-C9D5-4422-B2EF-7898FE601EFC}" type="datetimeFigureOut">
               <a:rPr lang="zh-CN" altLang="en-US" smtClean="0"/>
-              <a:t>2025/2/26</a:t>
+              <a:t>2025/6/26</a:t>
             </a:fld>
             <a:endParaRPr lang="zh-CN" altLang="en-US"/>
           </a:p>
@@ -1413,7 +1413,7 @@
           <a:p>
             <a:fld id="{3B8E4CC4-C9D5-4422-B2EF-7898FE601EFC}" type="datetimeFigureOut">
               <a:rPr lang="zh-CN" altLang="en-US" smtClean="0"/>
-              <a:t>2025/2/26</a:t>
+              <a:t>2025/6/26</a:t>
             </a:fld>
             <a:endParaRPr lang="zh-CN" altLang="en-US"/>
           </a:p>
@@ -1825,7 +1825,7 @@
           <a:p>
             <a:fld id="{3B8E4CC4-C9D5-4422-B2EF-7898FE601EFC}" type="datetimeFigureOut">
               <a:rPr lang="zh-CN" altLang="en-US" smtClean="0"/>
-              <a:t>2025/2/26</a:t>
+              <a:t>2025/6/26</a:t>
             </a:fld>
             <a:endParaRPr lang="zh-CN" altLang="en-US"/>
           </a:p>
@@ -1966,7 +1966,7 @@
           <a:p>
             <a:fld id="{3B8E4CC4-C9D5-4422-B2EF-7898FE601EFC}" type="datetimeFigureOut">
               <a:rPr lang="zh-CN" altLang="en-US" smtClean="0"/>
-              <a:t>2025/2/26</a:t>
+              <a:t>2025/6/26</a:t>
             </a:fld>
             <a:endParaRPr lang="zh-CN" altLang="en-US"/>
           </a:p>
@@ -2079,7 +2079,7 @@
           <a:p>
             <a:fld id="{3B8E4CC4-C9D5-4422-B2EF-7898FE601EFC}" type="datetimeFigureOut">
               <a:rPr lang="zh-CN" altLang="en-US" smtClean="0"/>
-              <a:t>2025/2/26</a:t>
+              <a:t>2025/6/26</a:t>
             </a:fld>
             <a:endParaRPr lang="zh-CN" altLang="en-US"/>
           </a:p>
@@ -2390,7 +2390,7 @@
           <a:p>
             <a:fld id="{3B8E4CC4-C9D5-4422-B2EF-7898FE601EFC}" type="datetimeFigureOut">
               <a:rPr lang="zh-CN" altLang="en-US" smtClean="0"/>
-              <a:t>2025/2/26</a:t>
+              <a:t>2025/6/26</a:t>
             </a:fld>
             <a:endParaRPr lang="zh-CN" altLang="en-US"/>
           </a:p>
@@ -2678,7 +2678,7 @@
           <a:p>
             <a:fld id="{3B8E4CC4-C9D5-4422-B2EF-7898FE601EFC}" type="datetimeFigureOut">
               <a:rPr lang="zh-CN" altLang="en-US" smtClean="0"/>
-              <a:t>2025/2/26</a:t>
+              <a:t>2025/6/26</a:t>
             </a:fld>
             <a:endParaRPr lang="zh-CN" altLang="en-US"/>
           </a:p>
@@ -2919,7 +2919,7 @@
           <a:p>
             <a:fld id="{3B8E4CC4-C9D5-4422-B2EF-7898FE601EFC}" type="datetimeFigureOut">
               <a:rPr lang="zh-CN" altLang="en-US" smtClean="0"/>
-              <a:t>2025/2/26</a:t>
+              <a:t>2025/6/26</a:t>
             </a:fld>
             <a:endParaRPr lang="zh-CN" altLang="en-US"/>
           </a:p>
@@ -3765,7 +3765,7 @@
           </p:cNvPicPr>
           <p:nvPr/>
         </p:nvPicPr>
-        <p:blipFill>
+        <p:blipFill rotWithShape="1">
           <a:blip r:embed="rId2">
             <a:extLst>
               <a:ext uri="{28A0092B-C50C-407E-A947-70E740481C1C}">
@@ -3773,14 +3773,13 @@
               </a:ext>
             </a:extLst>
           </a:blip>
-          <a:stretch>
-            <a:fillRect/>
-          </a:stretch>
+          <a:srcRect l="2248" t="2581" r="2378" b="2522"/>
+          <a:stretch/>
         </p:blipFill>
         <p:spPr>
           <a:xfrm>
-            <a:off x="1218520" y="1175195"/>
-            <a:ext cx="2996114" cy="2996114"/>
+            <a:off x="1285874" y="1252537"/>
+            <a:ext cx="2857501" cy="2843213"/>
           </a:xfrm>
           <a:prstGeom prst="rect">
             <a:avLst/>

</xml_diff>